<commit_message>
Applied various changes needed for real-life project (SyncDB Service):
Introduced the concept of JobGroup.
Refactored SQL JobLibrary folder structure.
Introduced Command Timeout configuration variable.
Introduced template parameters < > on top of SQL parameters (@) and macro parameters ({ }).
JobQueueManager accepts JSon object instead of comma-delimited parameters.
JobQueueManager can enqueue job group also.
</commit_message>
<xml_diff>
--- a/doc/JobQueue Project.pptx
+++ b/doc/JobQueue Project.pptx
@@ -298,7 +298,7 @@
           <a:p>
             <a:fld id="{C3A32E1B-F241-4B1B-A0AF-6E1A2F474A5F}" type="datetimeFigureOut">
               <a:rPr lang="en-US" smtClean="0"/>
-              <a:t>6/19/2012</a:t>
+              <a:t>7/9/2012</a:t>
             </a:fld>
             <a:endParaRPr lang="en-US"/>
           </a:p>
@@ -468,7 +468,7 @@
           <a:p>
             <a:fld id="{C3A32E1B-F241-4B1B-A0AF-6E1A2F474A5F}" type="datetimeFigureOut">
               <a:rPr lang="en-US" smtClean="0"/>
-              <a:t>6/19/2012</a:t>
+              <a:t>7/9/2012</a:t>
             </a:fld>
             <a:endParaRPr lang="en-US"/>
           </a:p>
@@ -648,7 +648,7 @@
           <a:p>
             <a:fld id="{C3A32E1B-F241-4B1B-A0AF-6E1A2F474A5F}" type="datetimeFigureOut">
               <a:rPr lang="en-US" smtClean="0"/>
-              <a:t>6/19/2012</a:t>
+              <a:t>7/9/2012</a:t>
             </a:fld>
             <a:endParaRPr lang="en-US"/>
           </a:p>
@@ -818,7 +818,7 @@
           <a:p>
             <a:fld id="{C3A32E1B-F241-4B1B-A0AF-6E1A2F474A5F}" type="datetimeFigureOut">
               <a:rPr lang="en-US" smtClean="0"/>
-              <a:t>6/19/2012</a:t>
+              <a:t>7/9/2012</a:t>
             </a:fld>
             <a:endParaRPr lang="en-US"/>
           </a:p>
@@ -1064,7 +1064,7 @@
           <a:p>
             <a:fld id="{C3A32E1B-F241-4B1B-A0AF-6E1A2F474A5F}" type="datetimeFigureOut">
               <a:rPr lang="en-US" smtClean="0"/>
-              <a:t>6/19/2012</a:t>
+              <a:t>7/9/2012</a:t>
             </a:fld>
             <a:endParaRPr lang="en-US"/>
           </a:p>
@@ -1352,7 +1352,7 @@
           <a:p>
             <a:fld id="{C3A32E1B-F241-4B1B-A0AF-6E1A2F474A5F}" type="datetimeFigureOut">
               <a:rPr lang="en-US" smtClean="0"/>
-              <a:t>6/19/2012</a:t>
+              <a:t>7/9/2012</a:t>
             </a:fld>
             <a:endParaRPr lang="en-US"/>
           </a:p>
@@ -1774,7 +1774,7 @@
           <a:p>
             <a:fld id="{C3A32E1B-F241-4B1B-A0AF-6E1A2F474A5F}" type="datetimeFigureOut">
               <a:rPr lang="en-US" smtClean="0"/>
-              <a:t>6/19/2012</a:t>
+              <a:t>7/9/2012</a:t>
             </a:fld>
             <a:endParaRPr lang="en-US"/>
           </a:p>
@@ -1892,7 +1892,7 @@
           <a:p>
             <a:fld id="{C3A32E1B-F241-4B1B-A0AF-6E1A2F474A5F}" type="datetimeFigureOut">
               <a:rPr lang="en-US" smtClean="0"/>
-              <a:t>6/19/2012</a:t>
+              <a:t>7/9/2012</a:t>
             </a:fld>
             <a:endParaRPr lang="en-US"/>
           </a:p>
@@ -1987,7 +1987,7 @@
           <a:p>
             <a:fld id="{C3A32E1B-F241-4B1B-A0AF-6E1A2F474A5F}" type="datetimeFigureOut">
               <a:rPr lang="en-US" smtClean="0"/>
-              <a:t>6/19/2012</a:t>
+              <a:t>7/9/2012</a:t>
             </a:fld>
             <a:endParaRPr lang="en-US"/>
           </a:p>
@@ -2264,7 +2264,7 @@
           <a:p>
             <a:fld id="{C3A32E1B-F241-4B1B-A0AF-6E1A2F474A5F}" type="datetimeFigureOut">
               <a:rPr lang="en-US" smtClean="0"/>
-              <a:t>6/19/2012</a:t>
+              <a:t>7/9/2012</a:t>
             </a:fld>
             <a:endParaRPr lang="en-US"/>
           </a:p>
@@ -2517,7 +2517,7 @@
           <a:p>
             <a:fld id="{C3A32E1B-F241-4B1B-A0AF-6E1A2F474A5F}" type="datetimeFigureOut">
               <a:rPr lang="en-US" smtClean="0"/>
-              <a:t>6/19/2012</a:t>
+              <a:t>7/9/2012</a:t>
             </a:fld>
             <a:endParaRPr lang="en-US"/>
           </a:p>
@@ -2730,7 +2730,7 @@
           <a:p>
             <a:fld id="{C3A32E1B-F241-4B1B-A0AF-6E1A2F474A5F}" type="datetimeFigureOut">
               <a:rPr lang="en-US" smtClean="0"/>
-              <a:t>6/19/2012</a:t>
+              <a:t>7/9/2012</a:t>
             </a:fld>
             <a:endParaRPr lang="en-US"/>
           </a:p>
@@ -6663,14 +6663,19 @@
         <p:spPr/>
         <p:txBody>
           <a:bodyPr>
-            <a:normAutofit lnSpcReduction="10000"/>
+            <a:normAutofit fontScale="92500" lnSpcReduction="10000"/>
           </a:bodyPr>
           <a:lstStyle/>
           <a:p>
             <a:r>
               <a:rPr lang="en-US" dirty="0" smtClean="0"/>
-              <a:t>Collection of Job subclasses</a:t>
-            </a:r>
+              <a:t>Collection of Job </a:t>
+            </a:r>
+            <a:r>
+              <a:rPr lang="en-US" dirty="0" smtClean="0"/>
+              <a:t>subclasses and Job Group subclasses.</a:t>
+            </a:r>
+            <a:endParaRPr lang="en-US" dirty="0" smtClean="0"/>
           </a:p>
           <a:p>
             <a:r>
@@ -6702,8 +6707,16 @@
             <a:pPr lvl="1"/>
             <a:r>
               <a:rPr lang="en-US" dirty="0" smtClean="0"/>
-              <a:t>Libraries are scanned to find the owner of the job.</a:t>
-            </a:r>
+              <a:t>Libraries are scanned to find the owner of the </a:t>
+            </a:r>
+            <a:r>
+              <a:rPr lang="en-US" dirty="0" smtClean="0"/>
+              <a:t>job.</a:t>
+            </a:r>
+          </a:p>
+          <a:p>
+            <a:pPr lvl="1"/>
+            <a:endParaRPr lang="en-US" dirty="0" smtClean="0"/>
           </a:p>
         </p:txBody>
       </p:sp>
@@ -6805,8 +6818,17 @@
             <a:pPr lvl="1"/>
             <a:r>
               <a:rPr lang="en-US" dirty="0" smtClean="0"/>
-              <a:t>Insert job (returns Job Id)</a:t>
-            </a:r>
+              <a:t>Insert job (returns Job Id</a:t>
+            </a:r>
+            <a:r>
+              <a:rPr lang="en-US" dirty="0" smtClean="0"/>
+              <a:t>) or Job Group (</a:t>
+            </a:r>
+            <a:r>
+              <a:rPr lang="en-US" smtClean="0"/>
+              <a:t>returns array of Job Ids)</a:t>
+            </a:r>
+            <a:endParaRPr lang="en-US" dirty="0" smtClean="0"/>
           </a:p>
           <a:p>
             <a:pPr lvl="1"/>

</xml_diff>